<commit_message>
Added Slides,Supporting Materials and Hands On Assignments
</commit_message>
<xml_diff>
--- a/Day 14/Slides/6. Calling Services Using Client-side Load Balancing/calling-services-using-client-side-load-balancing-slides.pptx
+++ b/Day 14/Slides/6. Calling Services Using Client-side Load Balancing/calling-services-using-client-side-load-balancing-slides.pptx
@@ -11821,7 +11821,7 @@
         <p:spPr>
           <a:xfrm>
             <a:off x="449580" y="3773423"/>
-            <a:ext cx="11389360" cy="2042160"/>
+            <a:ext cx="11389360" cy="1953895"/>
           </a:xfrm>
           <a:prstGeom prst="rect">
             <a:avLst/>
@@ -11849,9 +11849,137 @@
                 <a:spcPts val="40"/>
               </a:spcBef>
             </a:pPr>
-            <a:endParaRPr sz="2400">
-              <a:latin typeface="Times New Roman" panose="02020603050405020304"/>
-              <a:cs typeface="Times New Roman" panose="02020603050405020304"/>
+            <a:r>
+              <a:rPr lang="en-US" sz="2400" spc="-5" dirty="0">
+                <a:solidFill>
+                  <a:srgbClr val="799EBF"/>
+                </a:solidFill>
+                <a:latin typeface="Courier New" panose="02070309020205020404"/>
+                <a:cs typeface="Courier New" panose="02070309020205020404"/>
+                <a:sym typeface="+mn-ea"/>
+              </a:rPr>
+              <a:t>   </a:t>
+            </a:r>
+            <a:r>
+              <a:rPr sz="2400" spc="-5" dirty="0">
+                <a:solidFill>
+                  <a:srgbClr val="799EBF"/>
+                </a:solidFill>
+                <a:latin typeface="Courier New" panose="02070309020205020404"/>
+                <a:cs typeface="Courier New" panose="02070309020205020404"/>
+                <a:sym typeface="+mn-ea"/>
+              </a:rPr>
+              <a:t>ribbon:</a:t>
+            </a:r>
+            <a:endParaRPr sz="2400" spc="-5" dirty="0">
+              <a:solidFill>
+                <a:srgbClr val="799EBF"/>
+              </a:solidFill>
+              <a:latin typeface="Courier New" panose="02070309020205020404"/>
+              <a:cs typeface="Courier New" panose="02070309020205020404"/>
+              <a:sym typeface="+mn-ea"/>
+            </a:endParaRPr>
+          </a:p>
+          <a:p>
+            <a:pPr>
+              <a:lnSpc>
+                <a:spcPct val="100000"/>
+              </a:lnSpc>
+              <a:spcBef>
+                <a:spcPts val="40"/>
+              </a:spcBef>
+            </a:pPr>
+            <a:r>
+              <a:rPr sz="2400" spc="-5" dirty="0">
+                <a:solidFill>
+                  <a:srgbClr val="799EBF"/>
+                </a:solidFill>
+                <a:latin typeface="Courier New" panose="02070309020205020404"/>
+                <a:cs typeface="Courier New" panose="02070309020205020404"/>
+                <a:sym typeface="+mn-ea"/>
+              </a:rPr>
+              <a:t>  </a:t>
+            </a:r>
+            <a:r>
+              <a:rPr lang="en-US" sz="2400" spc="-5" dirty="0">
+                <a:solidFill>
+                  <a:srgbClr val="799EBF"/>
+                </a:solidFill>
+                <a:latin typeface="Courier New" panose="02070309020205020404"/>
+                <a:cs typeface="Courier New" panose="02070309020205020404"/>
+                <a:sym typeface="+mn-ea"/>
+              </a:rPr>
+              <a:t>	</a:t>
+            </a:r>
+            <a:r>
+              <a:rPr sz="2400" spc="-5" dirty="0">
+                <a:solidFill>
+                  <a:srgbClr val="799EBF"/>
+                </a:solidFill>
+                <a:latin typeface="Courier New" panose="02070309020205020404"/>
+                <a:cs typeface="Courier New" panose="02070309020205020404"/>
+                <a:sym typeface="+mn-ea"/>
+              </a:rPr>
+              <a:t>eureka:</a:t>
+            </a:r>
+            <a:endParaRPr sz="2400" spc="-5" dirty="0">
+              <a:solidFill>
+                <a:srgbClr val="799EBF"/>
+              </a:solidFill>
+              <a:latin typeface="Courier New" panose="02070309020205020404"/>
+              <a:cs typeface="Courier New" panose="02070309020205020404"/>
+              <a:sym typeface="+mn-ea"/>
+            </a:endParaRPr>
+          </a:p>
+          <a:p>
+            <a:pPr>
+              <a:lnSpc>
+                <a:spcPct val="100000"/>
+              </a:lnSpc>
+              <a:spcBef>
+                <a:spcPts val="40"/>
+              </a:spcBef>
+            </a:pPr>
+            <a:r>
+              <a:rPr sz="2400" spc="-5" dirty="0">
+                <a:solidFill>
+                  <a:srgbClr val="799EBF"/>
+                </a:solidFill>
+                <a:latin typeface="Courier New" panose="02070309020205020404"/>
+                <a:cs typeface="Courier New" panose="02070309020205020404"/>
+                <a:sym typeface="+mn-ea"/>
+              </a:rPr>
+              <a:t>   </a:t>
+            </a:r>
+            <a:r>
+              <a:rPr lang="en-US" sz="2400" spc="-5" dirty="0">
+                <a:solidFill>
+                  <a:srgbClr val="799EBF"/>
+                </a:solidFill>
+                <a:latin typeface="Courier New" panose="02070309020205020404"/>
+                <a:cs typeface="Courier New" panose="02070309020205020404"/>
+                <a:sym typeface="+mn-ea"/>
+              </a:rPr>
+              <a:t>		</a:t>
+            </a:r>
+            <a:r>
+              <a:rPr sz="2400" spc="-5" dirty="0">
+                <a:solidFill>
+                  <a:srgbClr val="799EBF"/>
+                </a:solidFill>
+                <a:latin typeface="Courier New" panose="02070309020205020404"/>
+                <a:cs typeface="Courier New" panose="02070309020205020404"/>
+                <a:sym typeface="+mn-ea"/>
+              </a:rPr>
+              <a:t>enabled: false</a:t>
+            </a:r>
+            <a:endParaRPr sz="2400" spc="-5" dirty="0">
+              <a:solidFill>
+                <a:srgbClr val="799EBF"/>
+              </a:solidFill>
+              <a:latin typeface="Courier New" panose="02070309020205020404"/>
+              <a:cs typeface="Courier New" panose="02070309020205020404"/>
+              <a:sym typeface="+mn-ea"/>
             </a:endParaRPr>
           </a:p>
           <a:p>
@@ -11880,77 +12008,6 @@
               </a:rPr>
               <a:t> </a:t>
             </a:r>
-            <a:r>
-              <a:rPr sz="1800" spc="-5" dirty="0">
-                <a:solidFill>
-                  <a:srgbClr val="799EBF"/>
-                </a:solidFill>
-                <a:latin typeface="Courier New" panose="02070309020205020404"/>
-                <a:cs typeface="Courier New" panose="02070309020205020404"/>
-              </a:rPr>
-              <a:t>ribbon:</a:t>
-            </a:r>
-            <a:endParaRPr sz="1800">
-              <a:latin typeface="Courier New" panose="02070309020205020404"/>
-              <a:cs typeface="Courier New" panose="02070309020205020404"/>
-            </a:endParaRPr>
-          </a:p>
-          <a:p>
-            <a:pPr marL="1275080" marR="8189595" indent="-273050">
-              <a:lnSpc>
-                <a:spcPct val="100000"/>
-              </a:lnSpc>
-            </a:pPr>
-            <a:r>
-              <a:rPr sz="1800" spc="-5" dirty="0">
-                <a:solidFill>
-                  <a:srgbClr val="799EBF"/>
-                </a:solidFill>
-                <a:latin typeface="Courier New" panose="02070309020205020404"/>
-                <a:cs typeface="Courier New" panose="02070309020205020404"/>
-              </a:rPr>
-              <a:t>eureka: </a:t>
-            </a:r>
-            <a:r>
-              <a:rPr sz="1800" spc="50" dirty="0">
-                <a:solidFill>
-                  <a:srgbClr val="799EBF"/>
-                </a:solidFill>
-                <a:latin typeface="Courier New" panose="02070309020205020404"/>
-                <a:cs typeface="Courier New" panose="02070309020205020404"/>
-              </a:rPr>
-              <a:t> </a:t>
-            </a:r>
-            <a:r>
-              <a:rPr sz="1800" spc="-5" dirty="0">
-                <a:solidFill>
-                  <a:srgbClr val="799EBF"/>
-                </a:solidFill>
-                <a:latin typeface="Courier New" panose="02070309020205020404"/>
-                <a:cs typeface="Courier New" panose="02070309020205020404"/>
-              </a:rPr>
-              <a:t>enabled:</a:t>
-            </a:r>
-            <a:r>
-              <a:rPr sz="1800" spc="-130" dirty="0">
-                <a:solidFill>
-                  <a:srgbClr val="799EBF"/>
-                </a:solidFill>
-                <a:latin typeface="Courier New" panose="02070309020205020404"/>
-                <a:cs typeface="Courier New" panose="02070309020205020404"/>
-              </a:rPr>
-              <a:t> </a:t>
-            </a:r>
-            <a:r>
-              <a:rPr sz="1800" spc="-5" dirty="0">
-                <a:solidFill>
-                  <a:srgbClr val="AEAEAE"/>
-                </a:solidFill>
-                <a:latin typeface="Courier New" panose="02070309020205020404"/>
-                <a:cs typeface="Courier New" panose="02070309020205020404"/>
-              </a:rPr>
-              <a:t>false</a:t>
-            </a:r>
             <a:endParaRPr sz="1800">
               <a:latin typeface="Courier New" panose="02070309020205020404"/>
               <a:cs typeface="Courier New" panose="02070309020205020404"/>
@@ -11962,6 +12019,54 @@
                 <a:spcPct val="100000"/>
               </a:lnSpc>
             </a:pPr>
+            <a:r>
+              <a:rPr lang="en-US" spc="-5" dirty="0">
+                <a:solidFill>
+                  <a:srgbClr val="799EBF"/>
+                </a:solidFill>
+                <a:latin typeface="Courier New" panose="02070309020205020404"/>
+                <a:cs typeface="Courier New" panose="02070309020205020404"/>
+                <a:sym typeface="+mn-ea"/>
+              </a:rPr>
+              <a:t> </a:t>
+            </a:r>
+            <a:r>
+              <a:rPr spc="-5" dirty="0">
+                <a:solidFill>
+                  <a:srgbClr val="799EBF"/>
+                </a:solidFill>
+                <a:latin typeface="Courier New" panose="02070309020205020404"/>
+                <a:cs typeface="Courier New" panose="02070309020205020404"/>
+                <a:sym typeface="+mn-ea"/>
+              </a:rPr>
+              <a:t>ribbon:</a:t>
+            </a:r>
+            <a:endParaRPr spc="-5" dirty="0">
+              <a:solidFill>
+                <a:srgbClr val="799EBF"/>
+              </a:solidFill>
+              <a:latin typeface="Courier New" panose="02070309020205020404"/>
+              <a:cs typeface="Courier New" panose="02070309020205020404"/>
+              <a:sym typeface="+mn-ea"/>
+            </a:endParaRPr>
+          </a:p>
+          <a:p>
+            <a:pPr marL="1002665">
+              <a:lnSpc>
+                <a:spcPct val="100000"/>
+              </a:lnSpc>
+            </a:pPr>
+            <a:r>
+              <a:rPr lang="en-US" spc="-5" dirty="0">
+                <a:solidFill>
+                  <a:srgbClr val="799EBF"/>
+                </a:solidFill>
+                <a:latin typeface="Courier New" panose="02070309020205020404"/>
+                <a:cs typeface="Courier New" panose="02070309020205020404"/>
+                <a:sym typeface="+mn-ea"/>
+              </a:rPr>
+              <a:t>	</a:t>
+            </a:r>
             <a:r>
               <a:rPr sz="1800" spc="-10" dirty="0">
                 <a:solidFill>
@@ -12110,7 +12215,7 @@
         <p:spPr>
           <a:xfrm>
             <a:off x="449580" y="1932432"/>
-            <a:ext cx="11389360" cy="1165860"/>
+            <a:ext cx="11389360" cy="927735"/>
           </a:xfrm>
           <a:prstGeom prst="rect">
             <a:avLst/>
@@ -12157,7 +12262,7 @@
                 <a:latin typeface="Courier New" panose="02070309020205020404"/>
                 <a:cs typeface="Courier New" panose="02070309020205020404"/>
               </a:rPr>
-              <a:t>&lt;ribbon_client_name&gt;.ribbon.eureka.enabled=</a:t>
+              <a:t>ribbon.eureka.enabled=</a:t>
             </a:r>
             <a:r>
               <a:rPr sz="1800" spc="-10" dirty="0">
@@ -13544,7 +13649,7 @@
         <p:spPr>
           <a:xfrm>
             <a:off x="410885" y="1767362"/>
-            <a:ext cx="9669145" cy="4330065"/>
+            <a:ext cx="9669145" cy="4383405"/>
           </a:xfrm>
           <a:prstGeom prst="rect">
             <a:avLst/>
@@ -13611,52 +13716,12 @@
             <a:r>
               <a:rPr sz="2800" spc="-10" dirty="0">
                 <a:solidFill>
-                  <a:srgbClr val="95A5A7"/>
-                </a:solidFill>
-                <a:latin typeface="Courier New" panose="02070309020205020404"/>
-                <a:cs typeface="Courier New" panose="02070309020205020404"/>
-              </a:rPr>
-              <a:t>io</a:t>
-            </a:r>
-            <a:r>
-              <a:rPr sz="2800" spc="-10" dirty="0">
-                <a:solidFill>
-                  <a:srgbClr val="C39900"/>
-                </a:solidFill>
-                <a:latin typeface="Courier New" panose="02070309020205020404"/>
-                <a:cs typeface="Courier New" panose="02070309020205020404"/>
-              </a:rPr>
-              <a:t>.</a:t>
-            </a:r>
-            <a:r>
-              <a:rPr sz="2800" spc="-10" dirty="0">
-                <a:solidFill>
-                  <a:srgbClr val="95A5A7"/>
-                </a:solidFill>
-                <a:latin typeface="Courier New" panose="02070309020205020404"/>
-                <a:cs typeface="Courier New" panose="02070309020205020404"/>
-              </a:rPr>
-              <a:t>schultz</a:t>
-            </a:r>
-            <a:r>
-              <a:rPr sz="2800" spc="-10" dirty="0">
-                <a:solidFill>
-                  <a:srgbClr val="C39900"/>
-                </a:solidFill>
-                <a:latin typeface="Courier New" panose="02070309020205020404"/>
-                <a:cs typeface="Courier New" panose="02070309020205020404"/>
-              </a:rPr>
-              <a:t>.</a:t>
-            </a:r>
-            <a:r>
-              <a:rPr sz="2800" spc="-10" dirty="0">
-                <a:solidFill>
-                  <a:srgbClr val="95A5A7"/>
-                </a:solidFill>
-                <a:latin typeface="Courier New" panose="02070309020205020404"/>
-                <a:cs typeface="Courier New" panose="02070309020205020404"/>
-              </a:rPr>
-              <a:t>dustin</a:t>
+                  <a:srgbClr val="00B050"/>
+                </a:solidFill>
+                <a:latin typeface="Courier New" panose="02070309020205020404"/>
+                <a:cs typeface="Courier New" panose="02070309020205020404"/>
+              </a:rPr>
+              <a:t>com.microservices.ribbontime.app</a:t>
             </a:r>
             <a:r>
               <a:rPr sz="2800" spc="-10" dirty="0">
@@ -14103,7 +14168,7 @@
         <p:spPr>
           <a:xfrm>
             <a:off x="0" y="0"/>
-            <a:ext cx="6096000" cy="6858000"/>
+            <a:ext cx="6506210" cy="6858000"/>
           </a:xfrm>
           <a:custGeom>
             <a:avLst/>
@@ -14150,8 +14215,8 @@
         </p:nvSpPr>
         <p:spPr>
           <a:xfrm>
-            <a:off x="698995" y="751331"/>
-            <a:ext cx="4796790" cy="314960"/>
+            <a:off x="77470" y="751205"/>
+            <a:ext cx="6623050" cy="596265"/>
           </a:xfrm>
           <a:prstGeom prst="rect">
             <a:avLst/>
@@ -14194,72 +14259,33 @@
             <a:r>
               <a:rPr sz="1900" spc="-5" dirty="0">
                 <a:solidFill>
-                  <a:srgbClr val="95A5A7"/>
-                </a:solidFill>
-                <a:latin typeface="Courier New" panose="02070309020205020404"/>
-                <a:cs typeface="Courier New" panose="02070309020205020404"/>
-              </a:rPr>
-              <a:t>io</a:t>
+                  <a:srgbClr val="00B050"/>
+                </a:solidFill>
+                <a:latin typeface="Courier New" panose="02070309020205020404"/>
+                <a:cs typeface="Courier New" panose="02070309020205020404"/>
+              </a:rPr>
+              <a:t>com.microservices.ribbontime.</a:t>
+            </a:r>
+            <a:r>
+              <a:rPr lang="en-US" sz="1900" spc="-5" dirty="0">
+                <a:solidFill>
+                  <a:srgbClr val="00B050"/>
+                </a:solidFill>
+                <a:latin typeface="Courier New" panose="02070309020205020404"/>
+                <a:cs typeface="Courier New" panose="02070309020205020404"/>
+                <a:sym typeface="+mn-ea"/>
+              </a:rPr>
+              <a:t>config.</a:t>
             </a:r>
             <a:r>
               <a:rPr sz="1900" spc="-5" dirty="0">
                 <a:solidFill>
-                  <a:srgbClr val="C39900"/>
-                </a:solidFill>
-                <a:latin typeface="Courier New" panose="02070309020205020404"/>
-                <a:cs typeface="Courier New" panose="02070309020205020404"/>
-              </a:rPr>
-              <a:t>.</a:t>
-            </a:r>
-            <a:r>
-              <a:rPr sz="1900" spc="-5" dirty="0">
-                <a:solidFill>
-                  <a:srgbClr val="95A5A7"/>
-                </a:solidFill>
-                <a:latin typeface="Courier New" panose="02070309020205020404"/>
-                <a:cs typeface="Courier New" panose="02070309020205020404"/>
-              </a:rPr>
-              <a:t>schultz</a:t>
-            </a:r>
-            <a:r>
-              <a:rPr sz="1900" spc="-5" dirty="0">
-                <a:solidFill>
-                  <a:srgbClr val="C39900"/>
-                </a:solidFill>
-                <a:latin typeface="Courier New" panose="02070309020205020404"/>
-                <a:cs typeface="Courier New" panose="02070309020205020404"/>
-              </a:rPr>
-              <a:t>.</a:t>
-            </a:r>
-            <a:r>
-              <a:rPr sz="1900" spc="-5" dirty="0">
-                <a:solidFill>
-                  <a:srgbClr val="95A5A7"/>
-                </a:solidFill>
-                <a:latin typeface="Courier New" panose="02070309020205020404"/>
-                <a:cs typeface="Courier New" panose="02070309020205020404"/>
-              </a:rPr>
-              <a:t>config</a:t>
-            </a:r>
-            <a:r>
-              <a:rPr sz="1900" spc="-5" dirty="0">
-                <a:solidFill>
-                  <a:srgbClr val="C39900"/>
-                </a:solidFill>
-                <a:latin typeface="Courier New" panose="02070309020205020404"/>
-                <a:cs typeface="Courier New" panose="02070309020205020404"/>
-              </a:rPr>
-              <a:t>.</a:t>
-            </a:r>
-            <a:r>
-              <a:rPr sz="1900" spc="-5" dirty="0">
-                <a:solidFill>
-                  <a:srgbClr val="95A5A7"/>
-                </a:solidFill>
-                <a:latin typeface="Courier New" panose="02070309020205020404"/>
-                <a:cs typeface="Courier New" panose="02070309020205020404"/>
-              </a:rPr>
-              <a:t>dustin</a:t>
+                  <a:srgbClr val="00B050"/>
+                </a:solidFill>
+                <a:latin typeface="Courier New" panose="02070309020205020404"/>
+                <a:cs typeface="Courier New" panose="02070309020205020404"/>
+              </a:rPr>
+              <a:t>app</a:t>
             </a:r>
             <a:r>
               <a:rPr sz="1900" spc="-5" dirty="0">

</xml_diff>